<commit_message>
Added math to presentation
</commit_message>
<xml_diff>
--- a/docs/assets/Presentation.pptx
+++ b/docs/assets/Presentation.pptx
@@ -7,9 +7,10 @@
   <p:sldIdLst>
     <p:sldId id="256" r:id="rId2"/>
     <p:sldId id="257" r:id="rId3"/>
-    <p:sldId id="258" r:id="rId4"/>
-    <p:sldId id="259" r:id="rId5"/>
-    <p:sldId id="260" r:id="rId6"/>
+    <p:sldId id="261" r:id="rId4"/>
+    <p:sldId id="258" r:id="rId5"/>
+    <p:sldId id="259" r:id="rId6"/>
+    <p:sldId id="260" r:id="rId7"/>
   </p:sldIdLst>
   <p:sldSz cx="12192000" cy="6858000"/>
   <p:notesSz cx="6858000" cy="9144000"/>
@@ -4299,7 +4300,13 @@
     </p:bg>
     <p:spTree>
       <p:nvGrpSpPr>
-        <p:cNvPr id="1" name=""/>
+        <p:cNvPr id="1" name="">
+          <a:extLst>
+            <a:ext uri="{FF2B5EF4-FFF2-40B4-BE49-F238E27FC236}">
+              <a16:creationId xmlns:a16="http://schemas.microsoft.com/office/drawing/2014/main" id="{6120C812-3773-3BF9-FC78-2B428022AF88}"/>
+            </a:ext>
+          </a:extLst>
+        </p:cNvPr>
         <p:cNvGrpSpPr/>
         <p:nvPr/>
       </p:nvGrpSpPr>
@@ -4313,10 +4320,10 @@
       </p:grpSpPr>
       <p:sp>
         <p:nvSpPr>
-          <p:cNvPr id="15" name="Rectangle 14">
-            <a:extLst>
-              <a:ext uri="{FF2B5EF4-FFF2-40B4-BE49-F238E27FC236}">
-                <a16:creationId xmlns:a16="http://schemas.microsoft.com/office/drawing/2014/main" id="{5E7AA7E8-8006-4E1F-A566-FCF37EE6F35D}"/>
+          <p:cNvPr id="25" name="Rectangle 24">
+            <a:extLst>
+              <a:ext uri="{FF2B5EF4-FFF2-40B4-BE49-F238E27FC236}">
+                <a16:creationId xmlns:a16="http://schemas.microsoft.com/office/drawing/2014/main" id="{CDBED143-2B35-E7AB-2108-E506B02B675A}"/>
               </a:ext>
               <a:ext uri="{C183D7F6-B498-43B3-948B-1728B52AA6E4}">
                 <adec:decorative xmlns:adec="http://schemas.microsoft.com/office/drawing/2017/decorative" val="1"/>
@@ -4392,6 +4399,657 @@
           <p:cNvPr id="2" name="Title 1">
             <a:extLst>
               <a:ext uri="{FF2B5EF4-FFF2-40B4-BE49-F238E27FC236}">
+                <a16:creationId xmlns:a16="http://schemas.microsoft.com/office/drawing/2014/main" id="{CCF96529-8647-F1BF-8CF9-D6B34A7D931C}"/>
+              </a:ext>
+            </a:extLst>
+          </p:cNvPr>
+          <p:cNvSpPr>
+            <a:spLocks noGrp="1"/>
+          </p:cNvSpPr>
+          <p:nvPr>
+            <p:ph type="title"/>
+          </p:nvPr>
+        </p:nvSpPr>
+        <p:spPr>
+          <a:xfrm>
+            <a:off x="242910" y="1598246"/>
+            <a:ext cx="4626709" cy="5122985"/>
+          </a:xfrm>
+        </p:spPr>
+        <p:txBody>
+          <a:bodyPr vert="horz" lIns="91440" tIns="45720" rIns="91440" bIns="45720" rtlCol="0" anchor="t">
+            <a:normAutofit/>
+          </a:bodyPr>
+          <a:lstStyle/>
+          <a:p>
+            <a:pPr algn="r"/>
+            <a:r>
+              <a:rPr lang="en-US" sz="8000" kern="1200" dirty="0">
+                <a:solidFill>
+                  <a:srgbClr val="FFFFFF"/>
+                </a:solidFill>
+                <a:latin typeface="+mj-lt"/>
+                <a:ea typeface="+mj-ea"/>
+                <a:cs typeface="+mj-cs"/>
+              </a:rPr>
+              <a:t>The Goal</a:t>
+            </a:r>
+          </a:p>
+        </p:txBody>
+      </p:sp>
+      <p:cxnSp>
+        <p:nvCxnSpPr>
+          <p:cNvPr id="26" name="Straight Connector 25">
+            <a:extLst>
+              <a:ext uri="{FF2B5EF4-FFF2-40B4-BE49-F238E27FC236}">
+                <a16:creationId xmlns:a16="http://schemas.microsoft.com/office/drawing/2014/main" id="{D9BF4434-DDA1-C2AB-872E-4D8F71445C25}"/>
+              </a:ext>
+              <a:ext uri="{C183D7F6-B498-43B3-948B-1728B52AA6E4}">
+                <adec:decorative xmlns:adec="http://schemas.microsoft.com/office/drawing/2017/decorative" val="1"/>
+              </a:ext>
+            </a:extLst>
+          </p:cNvPr>
+          <p:cNvCxnSpPr>
+            <a:cxnSpLocks noGrp="1" noRot="1" noChangeAspect="1" noMove="1" noResize="1" noEditPoints="1" noAdjustHandles="1" noChangeArrowheads="1" noChangeShapeType="1"/>
+          </p:cNvCxnSpPr>
+          <p:nvPr>
+            <p:extLst>
+              <p:ext uri="{386F3935-93C4-4BCD-93E2-E3B085C9AB24}">
+                <p16:designElem xmlns:p16="http://schemas.microsoft.com/office/powerpoint/2015/main" val="1"/>
+              </p:ext>
+            </p:extLst>
+          </p:nvPr>
+        </p:nvCxnSpPr>
+        <p:spPr>
+          <a:xfrm>
+            <a:off x="5447322" y="1589368"/>
+            <a:ext cx="0" cy="5259754"/>
+          </a:xfrm>
+          <a:prstGeom prst="line">
+            <a:avLst/>
+          </a:prstGeom>
+          <a:ln w="25400" cap="sq">
+            <a:solidFill>
+              <a:srgbClr val="FFFFFF"/>
+            </a:solidFill>
+            <a:bevel/>
+          </a:ln>
+        </p:spPr>
+        <p:style>
+          <a:lnRef idx="1">
+            <a:schemeClr val="accent1"/>
+          </a:lnRef>
+          <a:fillRef idx="0">
+            <a:schemeClr val="accent1"/>
+          </a:fillRef>
+          <a:effectRef idx="0">
+            <a:schemeClr val="accent1"/>
+          </a:effectRef>
+          <a:fontRef idx="minor">
+            <a:schemeClr val="tx1"/>
+          </a:fontRef>
+        </p:style>
+      </p:cxnSp>
+      <mc:AlternateContent xmlns:mc="http://schemas.openxmlformats.org/markup-compatibility/2006">
+        <mc:Choice xmlns:a14="http://schemas.microsoft.com/office/drawing/2010/main" Requires="a14">
+          <p:sp>
+            <p:nvSpPr>
+              <p:cNvPr id="4" name="TextBox 3">
+                <a:extLst>
+                  <a:ext uri="{FF2B5EF4-FFF2-40B4-BE49-F238E27FC236}">
+                    <a16:creationId xmlns:a16="http://schemas.microsoft.com/office/drawing/2014/main" id="{798B9E3F-F8B4-B6E5-DEBC-4841A72B39F4}"/>
+                  </a:ext>
+                </a:extLst>
+              </p:cNvPr>
+              <p:cNvSpPr txBox="1"/>
+              <p:nvPr/>
+            </p:nvSpPr>
+            <p:spPr>
+              <a:xfrm>
+                <a:off x="5740514" y="1220400"/>
+                <a:ext cx="5800910" cy="5298310"/>
+              </a:xfrm>
+              <a:prstGeom prst="rect">
+                <a:avLst/>
+              </a:prstGeom>
+              <a:noFill/>
+            </p:spPr>
+            <p:txBody>
+              <a:bodyPr wrap="square" rtlCol="0">
+                <a:spAutoFit/>
+              </a:bodyPr>
+              <a:lstStyle/>
+              <a:p>
+                <a:pPr marL="514350" indent="-514350">
+                  <a:buFont typeface="+mj-lt"/>
+                  <a:buAutoNum type="arabicPeriod"/>
+                </a:pPr>
+                <a:r>
+                  <a:rPr lang="en-US" sz="3200" dirty="0">
+                    <a:solidFill>
+                      <a:schemeClr val="bg1"/>
+                    </a:solidFill>
+                    <a:latin typeface="+mj-lt"/>
+                  </a:rPr>
+                  <a:t>Cross correlation: </a:t>
+                </a:r>
+                <a:r>
+                  <a:rPr lang="en-US" sz="3200" b="0" i="0" dirty="0">
+                    <a:solidFill>
+                      <a:schemeClr val="bg1"/>
+                    </a:solidFill>
+                    <a:effectLst/>
+                    <a:latin typeface="+mj-lt"/>
+                  </a:rPr>
+                  <a:t>measure of similarity between two waveforms or time series</a:t>
+                </a:r>
+              </a:p>
+              <a:p>
+                <a:pPr marL="971550" lvl="1" indent="-514350">
+                  <a:buFont typeface="+mj-lt"/>
+                  <a:buAutoNum type="alphaLcParenR"/>
+                </a:pPr>
+                <a:r>
+                  <a:rPr lang="en-US" sz="3200" dirty="0">
+                    <a:solidFill>
+                      <a:schemeClr val="bg1"/>
+                    </a:solidFill>
+                    <a:latin typeface="+mj-lt"/>
+                  </a:rPr>
+                  <a:t>Calculate Delay between microphones</a:t>
+                </a:r>
+              </a:p>
+              <a:p>
+                <a:pPr marL="971550" lvl="1" indent="-514350">
+                  <a:buFont typeface="+mj-lt"/>
+                  <a:buAutoNum type="alphaLcParenR"/>
+                </a:pPr>
+                <a:r>
+                  <a:rPr lang="en-US" sz="3200" dirty="0">
+                    <a:solidFill>
+                      <a:schemeClr val="bg1"/>
+                    </a:solidFill>
+                    <a:latin typeface="+mj-lt"/>
+                  </a:rPr>
+                  <a:t>Normalize Delay [-1, 1]</a:t>
+                </a:r>
+              </a:p>
+              <a:p>
+                <a:pPr marL="971550" lvl="1" indent="-514350">
+                  <a:buFont typeface="+mj-lt"/>
+                  <a:buAutoNum type="alphaLcParenR"/>
+                </a:pPr>
+                <a:r>
+                  <a:rPr lang="en-US" sz="3200" dirty="0">
+                    <a:solidFill>
+                      <a:schemeClr val="bg1"/>
+                    </a:solidFill>
+                    <a:latin typeface="+mj-lt"/>
+                  </a:rPr>
+                  <a:t>Calculate AOA using Taylor Series Approximation</a:t>
+                </a:r>
+              </a:p>
+              <a:p>
+                <a:pPr lvl="1"/>
+                <a:r>
+                  <a:rPr lang="en-US" sz="3200" dirty="0">
+                    <a:solidFill>
+                      <a:schemeClr val="bg1"/>
+                    </a:solidFill>
+                    <a:latin typeface="+mj-lt"/>
+                  </a:rPr>
+                  <a:t>       </a:t>
+                </a:r>
+                <a14:m>
+                  <m:oMath xmlns:m="http://schemas.openxmlformats.org/officeDocument/2006/math">
+                    <m:f>
+                      <m:fPr>
+                        <m:ctrlPr>
+                          <a:rPr lang="en-US" sz="3200" b="0" i="1" smtClean="0">
+                            <a:solidFill>
+                              <a:schemeClr val="bg1"/>
+                            </a:solidFill>
+                            <a:latin typeface="Cambria Math" panose="02040503050406030204" pitchFamily="18" charset="0"/>
+                          </a:rPr>
+                        </m:ctrlPr>
+                      </m:fPr>
+                      <m:num>
+                        <m:r>
+                          <a:rPr lang="en-US" sz="3200" b="0" i="1" smtClean="0">
+                            <a:solidFill>
+                              <a:schemeClr val="bg1"/>
+                            </a:solidFill>
+                            <a:latin typeface="Cambria Math" panose="02040503050406030204" pitchFamily="18" charset="0"/>
+                          </a:rPr>
+                          <m:t>𝜋</m:t>
+                        </m:r>
+                      </m:num>
+                      <m:den>
+                        <m:r>
+                          <a:rPr lang="en-US" sz="3200" b="0" i="1" smtClean="0">
+                            <a:solidFill>
+                              <a:schemeClr val="bg1"/>
+                            </a:solidFill>
+                            <a:latin typeface="Cambria Math" panose="02040503050406030204" pitchFamily="18" charset="0"/>
+                          </a:rPr>
+                          <m:t>2</m:t>
+                        </m:r>
+                      </m:den>
+                    </m:f>
+                    <m:r>
+                      <a:rPr lang="en-US" sz="3200" b="0" i="1" smtClean="0">
+                        <a:solidFill>
+                          <a:schemeClr val="bg1"/>
+                        </a:solidFill>
+                        <a:latin typeface="Cambria Math" panose="02040503050406030204" pitchFamily="18" charset="0"/>
+                      </a:rPr>
+                      <m:t>−</m:t>
+                    </m:r>
+                    <m:r>
+                      <a:rPr lang="en-US" sz="3200" b="0" i="1" smtClean="0">
+                        <a:solidFill>
+                          <a:schemeClr val="bg1"/>
+                        </a:solidFill>
+                        <a:latin typeface="Cambria Math" panose="02040503050406030204" pitchFamily="18" charset="0"/>
+                      </a:rPr>
+                      <m:t>𝑥</m:t>
+                    </m:r>
+                    <m:r>
+                      <a:rPr lang="en-US" sz="3200" b="0" i="1" smtClean="0">
+                        <a:solidFill>
+                          <a:schemeClr val="bg1"/>
+                        </a:solidFill>
+                        <a:latin typeface="Cambria Math" panose="02040503050406030204" pitchFamily="18" charset="0"/>
+                      </a:rPr>
+                      <m:t>−</m:t>
+                    </m:r>
+                    <m:f>
+                      <m:fPr>
+                        <m:ctrlPr>
+                          <a:rPr lang="en-US" sz="3200" b="0" i="1" smtClean="0">
+                            <a:solidFill>
+                              <a:schemeClr val="bg1"/>
+                            </a:solidFill>
+                            <a:latin typeface="Cambria Math" panose="02040503050406030204" pitchFamily="18" charset="0"/>
+                          </a:rPr>
+                        </m:ctrlPr>
+                      </m:fPr>
+                      <m:num>
+                        <m:sSup>
+                          <m:sSupPr>
+                            <m:ctrlPr>
+                              <a:rPr lang="en-US" sz="3200" b="0" i="1" smtClean="0">
+                                <a:solidFill>
+                                  <a:schemeClr val="bg1"/>
+                                </a:solidFill>
+                                <a:latin typeface="Cambria Math" panose="02040503050406030204" pitchFamily="18" charset="0"/>
+                              </a:rPr>
+                            </m:ctrlPr>
+                          </m:sSupPr>
+                          <m:e>
+                            <m:r>
+                              <a:rPr lang="en-US" sz="3200" b="0" i="1" smtClean="0">
+                                <a:solidFill>
+                                  <a:schemeClr val="bg1"/>
+                                </a:solidFill>
+                                <a:latin typeface="Cambria Math" panose="02040503050406030204" pitchFamily="18" charset="0"/>
+                              </a:rPr>
+                              <m:t>𝑥</m:t>
+                            </m:r>
+                          </m:e>
+                          <m:sup>
+                            <m:r>
+                              <a:rPr lang="en-US" sz="3200" b="0" i="1" smtClean="0">
+                                <a:solidFill>
+                                  <a:schemeClr val="bg1"/>
+                                </a:solidFill>
+                                <a:latin typeface="Cambria Math" panose="02040503050406030204" pitchFamily="18" charset="0"/>
+                              </a:rPr>
+                              <m:t>3</m:t>
+                            </m:r>
+                          </m:sup>
+                        </m:sSup>
+                      </m:num>
+                      <m:den>
+                        <m:r>
+                          <a:rPr lang="en-US" sz="3200" b="0" i="1" smtClean="0">
+                            <a:solidFill>
+                              <a:schemeClr val="bg1"/>
+                            </a:solidFill>
+                            <a:latin typeface="Cambria Math" panose="02040503050406030204" pitchFamily="18" charset="0"/>
+                          </a:rPr>
+                          <m:t>6</m:t>
+                        </m:r>
+                      </m:den>
+                    </m:f>
+                    <m:r>
+                      <a:rPr lang="en-US" sz="3200" b="0" i="1" smtClean="0">
+                        <a:solidFill>
+                          <a:schemeClr val="bg1"/>
+                        </a:solidFill>
+                        <a:latin typeface="Cambria Math" panose="02040503050406030204" pitchFamily="18" charset="0"/>
+                      </a:rPr>
+                      <m:t>+</m:t>
+                    </m:r>
+                    <m:f>
+                      <m:fPr>
+                        <m:ctrlPr>
+                          <a:rPr lang="en-US" sz="3200" b="0" i="1" smtClean="0">
+                            <a:solidFill>
+                              <a:schemeClr val="bg1"/>
+                            </a:solidFill>
+                            <a:latin typeface="Cambria Math" panose="02040503050406030204" pitchFamily="18" charset="0"/>
+                          </a:rPr>
+                        </m:ctrlPr>
+                      </m:fPr>
+                      <m:num>
+                        <m:r>
+                          <a:rPr lang="en-US" sz="3200" b="0" i="1" smtClean="0">
+                            <a:solidFill>
+                              <a:schemeClr val="bg1"/>
+                            </a:solidFill>
+                            <a:latin typeface="Cambria Math" panose="02040503050406030204" pitchFamily="18" charset="0"/>
+                          </a:rPr>
+                          <m:t>3</m:t>
+                        </m:r>
+                        <m:sSup>
+                          <m:sSupPr>
+                            <m:ctrlPr>
+                              <a:rPr lang="en-US" sz="3200" b="0" i="1" smtClean="0">
+                                <a:solidFill>
+                                  <a:schemeClr val="bg1"/>
+                                </a:solidFill>
+                                <a:latin typeface="Cambria Math" panose="02040503050406030204" pitchFamily="18" charset="0"/>
+                              </a:rPr>
+                            </m:ctrlPr>
+                          </m:sSupPr>
+                          <m:e>
+                            <m:r>
+                              <a:rPr lang="en-US" sz="3200" b="0" i="1" smtClean="0">
+                                <a:solidFill>
+                                  <a:schemeClr val="bg1"/>
+                                </a:solidFill>
+                                <a:latin typeface="Cambria Math" panose="02040503050406030204" pitchFamily="18" charset="0"/>
+                              </a:rPr>
+                              <m:t>𝑥</m:t>
+                            </m:r>
+                          </m:e>
+                          <m:sup>
+                            <m:r>
+                              <a:rPr lang="en-US" sz="3200" b="0" i="1" smtClean="0">
+                                <a:solidFill>
+                                  <a:schemeClr val="bg1"/>
+                                </a:solidFill>
+                                <a:latin typeface="Cambria Math" panose="02040503050406030204" pitchFamily="18" charset="0"/>
+                              </a:rPr>
+                              <m:t>5</m:t>
+                            </m:r>
+                          </m:sup>
+                        </m:sSup>
+                      </m:num>
+                      <m:den>
+                        <m:r>
+                          <a:rPr lang="en-US" sz="3200" b="0" i="1" smtClean="0">
+                            <a:solidFill>
+                              <a:schemeClr val="bg1"/>
+                            </a:solidFill>
+                            <a:latin typeface="Cambria Math" panose="02040503050406030204" pitchFamily="18" charset="0"/>
+                          </a:rPr>
+                          <m:t>40</m:t>
+                        </m:r>
+                      </m:den>
+                    </m:f>
+                    <m:r>
+                      <a:rPr lang="en-US" sz="3200" b="0" i="1" smtClean="0">
+                        <a:solidFill>
+                          <a:schemeClr val="bg1"/>
+                        </a:solidFill>
+                        <a:latin typeface="Cambria Math" panose="02040503050406030204" pitchFamily="18" charset="0"/>
+                      </a:rPr>
+                      <m:t>+</m:t>
+                    </m:r>
+                    <m:r>
+                      <a:rPr lang="en-US" sz="3200" b="0" i="1" smtClean="0">
+                        <a:solidFill>
+                          <a:schemeClr val="bg1"/>
+                        </a:solidFill>
+                        <a:latin typeface="Cambria Math" panose="02040503050406030204" pitchFamily="18" charset="0"/>
+                      </a:rPr>
+                      <m:t>𝑂</m:t>
+                    </m:r>
+                    <m:d>
+                      <m:dPr>
+                        <m:ctrlPr>
+                          <a:rPr lang="en-US" sz="3200" b="0" i="1" smtClean="0">
+                            <a:solidFill>
+                              <a:schemeClr val="bg1"/>
+                            </a:solidFill>
+                            <a:latin typeface="Cambria Math" panose="02040503050406030204" pitchFamily="18" charset="0"/>
+                          </a:rPr>
+                        </m:ctrlPr>
+                      </m:dPr>
+                      <m:e>
+                        <m:sSup>
+                          <m:sSupPr>
+                            <m:ctrlPr>
+                              <a:rPr lang="en-US" sz="3200" b="0" i="1" smtClean="0">
+                                <a:solidFill>
+                                  <a:schemeClr val="bg1"/>
+                                </a:solidFill>
+                                <a:latin typeface="Cambria Math" panose="02040503050406030204" pitchFamily="18" charset="0"/>
+                              </a:rPr>
+                            </m:ctrlPr>
+                          </m:sSupPr>
+                          <m:e>
+                            <m:r>
+                              <a:rPr lang="en-US" sz="3200" b="0" i="1" smtClean="0">
+                                <a:solidFill>
+                                  <a:schemeClr val="bg1"/>
+                                </a:solidFill>
+                                <a:latin typeface="Cambria Math" panose="02040503050406030204" pitchFamily="18" charset="0"/>
+                              </a:rPr>
+                              <m:t>𝑥</m:t>
+                            </m:r>
+                          </m:e>
+                          <m:sup>
+                            <m:r>
+                              <a:rPr lang="en-US" sz="3200" b="0" i="1" smtClean="0">
+                                <a:solidFill>
+                                  <a:schemeClr val="bg1"/>
+                                </a:solidFill>
+                                <a:latin typeface="Cambria Math" panose="02040503050406030204" pitchFamily="18" charset="0"/>
+                              </a:rPr>
+                              <m:t>7</m:t>
+                            </m:r>
+                          </m:sup>
+                        </m:sSup>
+                      </m:e>
+                    </m:d>
+                  </m:oMath>
+                </a14:m>
+                <a:endParaRPr lang="en-US" sz="3200" b="0" dirty="0">
+                  <a:solidFill>
+                    <a:schemeClr val="bg1"/>
+                  </a:solidFill>
+                  <a:latin typeface="+mj-lt"/>
+                </a:endParaRPr>
+              </a:p>
+              <a:p>
+                <a:pPr lvl="1"/>
+                <a:endParaRPr lang="en-US" sz="3200" dirty="0">
+                  <a:solidFill>
+                    <a:schemeClr val="bg1"/>
+                  </a:solidFill>
+                  <a:latin typeface="+mj-lt"/>
+                </a:endParaRPr>
+              </a:p>
+            </p:txBody>
+          </p:sp>
+        </mc:Choice>
+        <mc:Fallback>
+          <p:sp>
+            <p:nvSpPr>
+              <p:cNvPr id="4" name="TextBox 3">
+                <a:extLst>
+                  <a:ext uri="{FF2B5EF4-FFF2-40B4-BE49-F238E27FC236}">
+                    <a16:creationId xmlns:a16="http://schemas.microsoft.com/office/drawing/2014/main" id="{798B9E3F-F8B4-B6E5-DEBC-4841A72B39F4}"/>
+                  </a:ext>
+                </a:extLst>
+              </p:cNvPr>
+              <p:cNvSpPr txBox="1">
+                <a:spLocks noRot="1" noChangeAspect="1" noMove="1" noResize="1" noEditPoints="1" noAdjustHandles="1" noChangeArrowheads="1" noChangeShapeType="1" noTextEdit="1"/>
+              </p:cNvSpPr>
+              <p:nvPr/>
+            </p:nvSpPr>
+            <p:spPr>
+              <a:xfrm>
+                <a:off x="5740514" y="1220400"/>
+                <a:ext cx="5800910" cy="5298310"/>
+              </a:xfrm>
+              <a:prstGeom prst="rect">
+                <a:avLst/>
+              </a:prstGeom>
+              <a:blipFill>
+                <a:blip r:embed="rId2"/>
+                <a:stretch>
+                  <a:fillRect l="-2839" t="-1611"/>
+                </a:stretch>
+              </a:blipFill>
+            </p:spPr>
+            <p:txBody>
+              <a:bodyPr/>
+              <a:lstStyle/>
+              <a:p>
+                <a:r>
+                  <a:rPr lang="en-US">
+                    <a:noFill/>
+                  </a:rPr>
+                  <a:t> </a:t>
+                </a:r>
+              </a:p>
+            </p:txBody>
+          </p:sp>
+        </mc:Fallback>
+      </mc:AlternateContent>
+    </p:spTree>
+    <p:extLst>
+      <p:ext uri="{BB962C8B-B14F-4D97-AF65-F5344CB8AC3E}">
+        <p14:creationId xmlns:p14="http://schemas.microsoft.com/office/powerpoint/2010/main" val="1368267794"/>
+      </p:ext>
+    </p:extLst>
+  </p:cSld>
+  <p:clrMapOvr>
+    <a:masterClrMapping/>
+  </p:clrMapOvr>
+</p:sld>
+</file>
+
+<file path=ppt/slides/slide4.xml><?xml version="1.0" encoding="utf-8"?>
+<p:sld xmlns:a="http://schemas.openxmlformats.org/drawingml/2006/main" xmlns:r="http://schemas.openxmlformats.org/officeDocument/2006/relationships" xmlns:p="http://schemas.openxmlformats.org/presentationml/2006/main">
+  <p:cSld>
+    <p:bg>
+      <p:bgPr>
+        <a:solidFill>
+          <a:schemeClr val="bg1"/>
+        </a:solidFill>
+        <a:effectLst/>
+      </p:bgPr>
+    </p:bg>
+    <p:spTree>
+      <p:nvGrpSpPr>
+        <p:cNvPr id="1" name=""/>
+        <p:cNvGrpSpPr/>
+        <p:nvPr/>
+      </p:nvGrpSpPr>
+      <p:grpSpPr>
+        <a:xfrm>
+          <a:off x="0" y="0"/>
+          <a:ext cx="0" cy="0"/>
+          <a:chOff x="0" y="0"/>
+          <a:chExt cx="0" cy="0"/>
+        </a:xfrm>
+      </p:grpSpPr>
+      <p:sp>
+        <p:nvSpPr>
+          <p:cNvPr id="15" name="Rectangle 14">
+            <a:extLst>
+              <a:ext uri="{FF2B5EF4-FFF2-40B4-BE49-F238E27FC236}">
+                <a16:creationId xmlns:a16="http://schemas.microsoft.com/office/drawing/2014/main" id="{5E7AA7E8-8006-4E1F-A566-FCF37EE6F35D}"/>
+              </a:ext>
+              <a:ext uri="{C183D7F6-B498-43B3-948B-1728B52AA6E4}">
+                <adec:decorative xmlns:adec="http://schemas.microsoft.com/office/drawing/2017/decorative" val="1"/>
+              </a:ext>
+            </a:extLst>
+          </p:cNvPr>
+          <p:cNvSpPr>
+            <a:spLocks noGrp="1" noRot="1" noChangeAspect="1" noMove="1" noResize="1" noEditPoints="1" noAdjustHandles="1" noChangeArrowheads="1" noChangeShapeType="1" noTextEdit="1"/>
+          </p:cNvSpPr>
+          <p:nvPr>
+            <p:extLst>
+              <p:ext uri="{386F3935-93C4-4BCD-93E2-E3B085C9AB24}">
+                <p16:designElem xmlns:p16="http://schemas.microsoft.com/office/powerpoint/2015/main" val="1"/>
+              </p:ext>
+            </p:extLst>
+          </p:nvPr>
+        </p:nvSpPr>
+        <p:spPr>
+          <a:xfrm>
+            <a:off x="0" y="0"/>
+            <a:ext cx="12192000" cy="6858000"/>
+          </a:xfrm>
+          <a:prstGeom prst="rect">
+            <a:avLst/>
+          </a:prstGeom>
+          <a:gradFill flip="none" rotWithShape="1">
+            <a:gsLst>
+              <a:gs pos="0">
+                <a:schemeClr val="accent1"/>
+              </a:gs>
+              <a:gs pos="100000">
+                <a:schemeClr val="accent2"/>
+              </a:gs>
+            </a:gsLst>
+            <a:lin ang="2700000" scaled="1"/>
+            <a:tileRect/>
+          </a:gradFill>
+          <a:ln>
+            <a:noFill/>
+          </a:ln>
+        </p:spPr>
+        <p:style>
+          <a:lnRef idx="2">
+            <a:schemeClr val="accent1">
+              <a:shade val="50000"/>
+            </a:schemeClr>
+          </a:lnRef>
+          <a:fillRef idx="1">
+            <a:schemeClr val="accent1"/>
+          </a:fillRef>
+          <a:effectRef idx="0">
+            <a:schemeClr val="accent1"/>
+          </a:effectRef>
+          <a:fontRef idx="minor">
+            <a:schemeClr val="lt1"/>
+          </a:fontRef>
+        </p:style>
+        <p:txBody>
+          <a:bodyPr rtlCol="0" anchor="ctr"/>
+          <a:lstStyle/>
+          <a:p>
+            <a:pPr algn="ctr"/>
+            <a:endParaRPr lang="en-US">
+              <a:solidFill>
+                <a:srgbClr val="FFFFFF"/>
+              </a:solidFill>
+            </a:endParaRPr>
+          </a:p>
+        </p:txBody>
+      </p:sp>
+      <p:sp>
+        <p:nvSpPr>
+          <p:cNvPr id="2" name="Title 1">
+            <a:extLst>
+              <a:ext uri="{FF2B5EF4-FFF2-40B4-BE49-F238E27FC236}">
                 <a16:creationId xmlns:a16="http://schemas.microsoft.com/office/drawing/2014/main" id="{6EFCF0D2-89F5-553A-DA13-8649B4BDBF3C}"/>
               </a:ext>
             </a:extLst>
@@ -4532,7 +5190,7 @@
 </p:sld>
 </file>
 
-<file path=ppt/slides/slide4.xml><?xml version="1.0" encoding="utf-8"?>
+<file path=ppt/slides/slide5.xml><?xml version="1.0" encoding="utf-8"?>
 <p:sld xmlns:a="http://schemas.openxmlformats.org/drawingml/2006/main" xmlns:r="http://schemas.openxmlformats.org/officeDocument/2006/relationships" xmlns:p="http://schemas.openxmlformats.org/presentationml/2006/main">
   <p:cSld>
     <p:bg>
@@ -5019,7 +5677,7 @@
 </p:sld>
 </file>
 
-<file path=ppt/slides/slide5.xml><?xml version="1.0" encoding="utf-8"?>
+<file path=ppt/slides/slide6.xml><?xml version="1.0" encoding="utf-8"?>
 <p:sld xmlns:a="http://schemas.openxmlformats.org/drawingml/2006/main" xmlns:r="http://schemas.openxmlformats.org/officeDocument/2006/relationships" xmlns:p="http://schemas.openxmlformats.org/presentationml/2006/main">
   <p:cSld>
     <p:bg>

</xml_diff>